<commit_message>
Removed ElectronWaveImage and added ComplexSignal1D/2D User guide is updated accordingly Plot docstrings are now defined in hyperspy/docstings/plot.py A lot of smaller changes
</commit_message>
<xml_diff>
--- a/doc/user_guide/images/HyperSpySignalOverview.pptx
+++ b/doc/user_guide/images/HyperSpySignalOverview.pptx
@@ -288,7 +288,7 @@
           <a:p>
             <a:fld id="{2E6F31E7-F7C9-4F09-AB17-051C3CE0F15A}" type="datetimeFigureOut">
               <a:rPr lang="en-GB" smtClean="0"/>
-              <a:t>27/06/2016</a:t>
+              <a:t>08/07/2016</a:t>
             </a:fld>
             <a:endParaRPr lang="en-GB"/>
           </a:p>
@@ -458,7 +458,7 @@
           <a:p>
             <a:fld id="{2E6F31E7-F7C9-4F09-AB17-051C3CE0F15A}" type="datetimeFigureOut">
               <a:rPr lang="en-GB" smtClean="0"/>
-              <a:t>27/06/2016</a:t>
+              <a:t>08/07/2016</a:t>
             </a:fld>
             <a:endParaRPr lang="en-GB"/>
           </a:p>
@@ -638,7 +638,7 @@
           <a:p>
             <a:fld id="{2E6F31E7-F7C9-4F09-AB17-051C3CE0F15A}" type="datetimeFigureOut">
               <a:rPr lang="en-GB" smtClean="0"/>
-              <a:t>27/06/2016</a:t>
+              <a:t>08/07/2016</a:t>
             </a:fld>
             <a:endParaRPr lang="en-GB"/>
           </a:p>
@@ -808,7 +808,7 @@
           <a:p>
             <a:fld id="{2E6F31E7-F7C9-4F09-AB17-051C3CE0F15A}" type="datetimeFigureOut">
               <a:rPr lang="en-GB" smtClean="0"/>
-              <a:t>27/06/2016</a:t>
+              <a:t>08/07/2016</a:t>
             </a:fld>
             <a:endParaRPr lang="en-GB"/>
           </a:p>
@@ -1054,7 +1054,7 @@
           <a:p>
             <a:fld id="{2E6F31E7-F7C9-4F09-AB17-051C3CE0F15A}" type="datetimeFigureOut">
               <a:rPr lang="en-GB" smtClean="0"/>
-              <a:t>27/06/2016</a:t>
+              <a:t>08/07/2016</a:t>
             </a:fld>
             <a:endParaRPr lang="en-GB"/>
           </a:p>
@@ -1342,7 +1342,7 @@
           <a:p>
             <a:fld id="{2E6F31E7-F7C9-4F09-AB17-051C3CE0F15A}" type="datetimeFigureOut">
               <a:rPr lang="en-GB" smtClean="0"/>
-              <a:t>27/06/2016</a:t>
+              <a:t>08/07/2016</a:t>
             </a:fld>
             <a:endParaRPr lang="en-GB"/>
           </a:p>
@@ -1764,7 +1764,7 @@
           <a:p>
             <a:fld id="{2E6F31E7-F7C9-4F09-AB17-051C3CE0F15A}" type="datetimeFigureOut">
               <a:rPr lang="en-GB" smtClean="0"/>
-              <a:t>27/06/2016</a:t>
+              <a:t>08/07/2016</a:t>
             </a:fld>
             <a:endParaRPr lang="en-GB"/>
           </a:p>
@@ -1882,7 +1882,7 @@
           <a:p>
             <a:fld id="{2E6F31E7-F7C9-4F09-AB17-051C3CE0F15A}" type="datetimeFigureOut">
               <a:rPr lang="en-GB" smtClean="0"/>
-              <a:t>27/06/2016</a:t>
+              <a:t>08/07/2016</a:t>
             </a:fld>
             <a:endParaRPr lang="en-GB"/>
           </a:p>
@@ -1977,7 +1977,7 @@
           <a:p>
             <a:fld id="{2E6F31E7-F7C9-4F09-AB17-051C3CE0F15A}" type="datetimeFigureOut">
               <a:rPr lang="en-GB" smtClean="0"/>
-              <a:t>27/06/2016</a:t>
+              <a:t>08/07/2016</a:t>
             </a:fld>
             <a:endParaRPr lang="en-GB"/>
           </a:p>
@@ -2254,7 +2254,7 @@
           <a:p>
             <a:fld id="{2E6F31E7-F7C9-4F09-AB17-051C3CE0F15A}" type="datetimeFigureOut">
               <a:rPr lang="en-GB" smtClean="0"/>
-              <a:t>27/06/2016</a:t>
+              <a:t>08/07/2016</a:t>
             </a:fld>
             <a:endParaRPr lang="en-GB"/>
           </a:p>
@@ -2507,7 +2507,7 @@
           <a:p>
             <a:fld id="{2E6F31E7-F7C9-4F09-AB17-051C3CE0F15A}" type="datetimeFigureOut">
               <a:rPr lang="en-GB" smtClean="0"/>
-              <a:t>27/06/2016</a:t>
+              <a:t>08/07/2016</a:t>
             </a:fld>
             <a:endParaRPr lang="en-GB"/>
           </a:p>
@@ -2720,7 +2720,7 @@
           <a:p>
             <a:fld id="{2E6F31E7-F7C9-4F09-AB17-051C3CE0F15A}" type="datetimeFigureOut">
               <a:rPr lang="en-GB" smtClean="0"/>
-              <a:t>27/06/2016</a:t>
+              <a:t>08/07/2016</a:t>
             </a:fld>
             <a:endParaRPr lang="en-GB"/>
           </a:p>
@@ -3157,7 +3157,7 @@
         <p:spPr>
           <a:xfrm>
             <a:off x="2871616" y="1121104"/>
-            <a:ext cx="3276014" cy="3163210"/>
+            <a:ext cx="3212552" cy="3163210"/>
           </a:xfrm>
           <a:prstGeom prst="rect">
             <a:avLst/>
@@ -3571,14 +3571,14 @@
           <p:cNvPr id="35" name="Gewinkelte Verbindung 34"/>
           <p:cNvCxnSpPr>
             <a:stCxn id="7" idx="1"/>
-            <a:endCxn id="8" idx="0"/>
+            <a:endCxn id="33" idx="0"/>
           </p:cNvCxnSpPr>
           <p:nvPr/>
         </p:nvCxnSpPr>
         <p:spPr>
           <a:xfrm rot="10800000" flipV="1">
-            <a:off x="3597927" y="1619694"/>
-            <a:ext cx="258897" cy="1999181"/>
+            <a:off x="3607451" y="1619694"/>
+            <a:ext cx="249373" cy="844737"/>
           </a:xfrm>
           <a:prstGeom prst="bentConnector2">
             <a:avLst/>
@@ -3610,14 +3610,14 @@
           <p:cNvPr id="36" name="Gewinkelte Verbindung 35"/>
           <p:cNvCxnSpPr>
             <a:stCxn id="7" idx="3"/>
-            <a:endCxn id="9" idx="0"/>
+            <a:endCxn id="34" idx="0"/>
           </p:cNvCxnSpPr>
           <p:nvPr/>
         </p:nvCxnSpPr>
         <p:spPr>
           <a:xfrm>
             <a:off x="5080958" y="1619695"/>
-            <a:ext cx="302042" cy="1999181"/>
+            <a:ext cx="247126" cy="844736"/>
           </a:xfrm>
           <a:prstGeom prst="bentConnector2">
             <a:avLst/>
@@ -3656,7 +3656,7 @@
         <p:spPr>
           <a:xfrm>
             <a:off x="5080958" y="645880"/>
-            <a:ext cx="2191342" cy="1693806"/>
+            <a:ext cx="1759294" cy="1818551"/>
           </a:xfrm>
           <a:prstGeom prst="bentConnector2">
             <a:avLst/>
@@ -3694,8 +3694,8 @@
         </p:nvCxnSpPr>
         <p:spPr>
           <a:xfrm rot="10800000" flipV="1">
-            <a:off x="1727685" y="645879"/>
-            <a:ext cx="2129138" cy="1624271"/>
+            <a:off x="2087725" y="645879"/>
+            <a:ext cx="1769098" cy="1818551"/>
           </a:xfrm>
           <a:prstGeom prst="bentConnector2">
             <a:avLst/>
@@ -3733,12 +3733,12 @@
         </p:nvCxnSpPr>
         <p:spPr>
           <a:xfrm rot="5400000">
-            <a:off x="635914" y="3633372"/>
-            <a:ext cx="1895511" cy="288033"/>
+            <a:off x="913074" y="3550492"/>
+            <a:ext cx="1701231" cy="648073"/>
           </a:xfrm>
           <a:prstGeom prst="bentConnector3">
             <a:avLst>
-              <a:gd name="adj1" fmla="val 82461"/>
+              <a:gd name="adj1" fmla="val 86206"/>
             </a:avLst>
           </a:prstGeom>
           <a:ln w="38100">
@@ -3774,12 +3774,12 @@
         </p:nvCxnSpPr>
         <p:spPr>
           <a:xfrm rot="16200000" flipH="1">
-            <a:off x="1548937" y="3008380"/>
-            <a:ext cx="1907778" cy="1550283"/>
+            <a:off x="1826097" y="3285540"/>
+            <a:ext cx="1713498" cy="1190243"/>
           </a:xfrm>
           <a:prstGeom prst="bentConnector3">
             <a:avLst>
-              <a:gd name="adj1" fmla="val 82252"/>
+              <a:gd name="adj1" fmla="val 85576"/>
             </a:avLst>
           </a:prstGeom>
           <a:ln w="38100">
@@ -4011,7 +4011,7 @@
         </p:nvSpPr>
         <p:spPr>
           <a:xfrm>
-            <a:off x="1115617" y="2270151"/>
+            <a:off x="1475657" y="2464431"/>
             <a:ext cx="1224135" cy="559482"/>
           </a:xfrm>
           <a:prstGeom prst="roundRect">
@@ -4093,7 +4093,7 @@
         </p:nvSpPr>
         <p:spPr>
           <a:xfrm>
-            <a:off x="6660232" y="2339686"/>
+            <a:off x="6228184" y="2464431"/>
             <a:ext cx="1224135" cy="559482"/>
           </a:xfrm>
           <a:prstGeom prst="roundRect">
@@ -4144,9 +4144,15 @@
               </a:rPr>
               <a:t>Signal</a:t>
             </a:r>
-          </a:p>
-          <a:p>
-            <a:pPr algn="ctr"/>
+            <a:br>
+              <a:rPr lang="de-DE" sz="1600" dirty="0" smtClean="0">
+                <a:solidFill>
+                  <a:schemeClr val="accent2">
+                    <a:lumMod val="50000"/>
+                  </a:schemeClr>
+                </a:solidFill>
+              </a:rPr>
+            </a:br>
             <a:r>
               <a:rPr lang="de-DE" sz="1600" dirty="0" smtClean="0">
                 <a:solidFill>
@@ -4175,7 +4181,7 @@
         </p:nvSpPr>
         <p:spPr>
           <a:xfrm>
-            <a:off x="2985858" y="3618876"/>
+            <a:off x="2995383" y="3618876"/>
             <a:ext cx="1224135" cy="559482"/>
           </a:xfrm>
           <a:prstGeom prst="roundRect">
@@ -4258,13 +4264,13 @@
       </p:sp>
       <p:sp>
         <p:nvSpPr>
-          <p:cNvPr id="9" name="Abgerundetes Rechteck 8"/>
+          <p:cNvPr id="10" name="Abgerundetes Rechteck 9"/>
           <p:cNvSpPr/>
           <p:nvPr/>
         </p:nvSpPr>
         <p:spPr>
           <a:xfrm>
-            <a:off x="4770932" y="3618876"/>
+            <a:off x="827584" y="4725144"/>
             <a:ext cx="1224135" cy="559482"/>
           </a:xfrm>
           <a:prstGeom prst="roundRect">
@@ -4306,14 +4312,27 @@
           <a:p>
             <a:pPr algn="ctr"/>
             <a:r>
-              <a:rPr lang="de-DE" sz="1600" dirty="0" err="1" smtClean="0">
+              <a:rPr lang="de-DE" sz="1600" dirty="0" smtClean="0">
                 <a:solidFill>
                   <a:schemeClr val="accent2">
                     <a:lumMod val="50000"/>
                   </a:schemeClr>
                 </a:solidFill>
               </a:rPr>
-              <a:t>Electron</a:t>
+              <a:t>EDS</a:t>
+            </a:r>
+          </a:p>
+          <a:p>
+            <a:pPr algn="ctr"/>
+            <a:r>
+              <a:rPr lang="de-DE" sz="1600" dirty="0" err="1" smtClean="0">
+                <a:solidFill>
+                  <a:schemeClr val="accent2">
+                    <a:lumMod val="50000"/>
+                  </a:schemeClr>
+                </a:solidFill>
+              </a:rPr>
+              <a:t>Spectrum</a:t>
             </a:r>
             <a:endParaRPr lang="de-DE" sz="1600" dirty="0" smtClean="0">
               <a:solidFill>
@@ -4323,37 +4342,17 @@
               </a:solidFill>
             </a:endParaRPr>
           </a:p>
-          <a:p>
-            <a:pPr algn="ctr"/>
-            <a:r>
-              <a:rPr lang="de-DE" sz="1600" dirty="0" err="1" smtClean="0">
-                <a:solidFill>
-                  <a:schemeClr val="accent2">
-                    <a:lumMod val="50000"/>
-                  </a:schemeClr>
-                </a:solidFill>
-              </a:rPr>
-              <a:t>WaveImage</a:t>
-            </a:r>
-            <a:endParaRPr lang="en-GB" sz="1600" dirty="0">
-              <a:solidFill>
-                <a:schemeClr val="accent2">
-                  <a:lumMod val="50000"/>
-                </a:schemeClr>
-              </a:solidFill>
-            </a:endParaRPr>
-          </a:p>
-        </p:txBody>
-      </p:sp>
-      <p:sp>
-        <p:nvSpPr>
-          <p:cNvPr id="10" name="Abgerundetes Rechteck 9"/>
+        </p:txBody>
+      </p:sp>
+      <p:sp>
+        <p:nvSpPr>
+          <p:cNvPr id="11" name="Abgerundetes Rechteck 10"/>
           <p:cNvSpPr/>
           <p:nvPr/>
         </p:nvSpPr>
         <p:spPr>
           <a:xfrm>
-            <a:off x="827584" y="4725144"/>
+            <a:off x="1558226" y="5663296"/>
             <a:ext cx="1224135" cy="559482"/>
           </a:xfrm>
           <a:prstGeom prst="roundRect">
@@ -4395,27 +4394,14 @@
           <a:p>
             <a:pPr algn="ctr"/>
             <a:r>
-              <a:rPr lang="de-DE" sz="1600" dirty="0" smtClean="0">
+              <a:rPr lang="de-DE" sz="1600" smtClean="0">
                 <a:solidFill>
                   <a:schemeClr val="accent2">
                     <a:lumMod val="50000"/>
                   </a:schemeClr>
                 </a:solidFill>
               </a:rPr>
-              <a:t>EDS</a:t>
-            </a:r>
-          </a:p>
-          <a:p>
-            <a:pPr algn="ctr"/>
-            <a:r>
-              <a:rPr lang="de-DE" sz="1600" dirty="0" err="1" smtClean="0">
-                <a:solidFill>
-                  <a:schemeClr val="accent2">
-                    <a:lumMod val="50000"/>
-                  </a:schemeClr>
-                </a:solidFill>
-              </a:rPr>
-              <a:t>Spectrum</a:t>
+              <a:t>EDSSEM</a:t>
             </a:r>
             <a:endParaRPr lang="de-DE" sz="1600" dirty="0" smtClean="0">
               <a:solidFill>
@@ -4425,17 +4411,37 @@
               </a:solidFill>
             </a:endParaRPr>
           </a:p>
-        </p:txBody>
-      </p:sp>
-      <p:sp>
-        <p:nvSpPr>
-          <p:cNvPr id="11" name="Abgerundetes Rechteck 10"/>
+          <a:p>
+            <a:pPr algn="ctr"/>
+            <a:r>
+              <a:rPr lang="de-DE" sz="1600" dirty="0" err="1" smtClean="0">
+                <a:solidFill>
+                  <a:schemeClr val="accent2">
+                    <a:lumMod val="50000"/>
+                  </a:schemeClr>
+                </a:solidFill>
+              </a:rPr>
+              <a:t>Spectrum</a:t>
+            </a:r>
+            <a:endParaRPr lang="de-DE" sz="1600" dirty="0" smtClean="0">
+              <a:solidFill>
+                <a:schemeClr val="accent2">
+                  <a:lumMod val="50000"/>
+                </a:schemeClr>
+              </a:solidFill>
+            </a:endParaRPr>
+          </a:p>
+        </p:txBody>
+      </p:sp>
+      <p:sp>
+        <p:nvSpPr>
+          <p:cNvPr id="12" name="Abgerundetes Rechteck 11"/>
           <p:cNvSpPr/>
           <p:nvPr/>
         </p:nvSpPr>
         <p:spPr>
           <a:xfrm>
-            <a:off x="1558226" y="5663296"/>
+            <a:off x="107504" y="5663296"/>
             <a:ext cx="1224135" cy="559482"/>
           </a:xfrm>
           <a:prstGeom prst="roundRect">
@@ -4477,14 +4483,27 @@
           <a:p>
             <a:pPr algn="ctr"/>
             <a:r>
-              <a:rPr lang="de-DE" sz="1600" smtClean="0">
+              <a:rPr lang="de-DE" sz="1600" dirty="0" smtClean="0">
                 <a:solidFill>
                   <a:schemeClr val="accent2">
                     <a:lumMod val="50000"/>
                   </a:schemeClr>
                 </a:solidFill>
               </a:rPr>
-              <a:t>EDSSEM</a:t>
+              <a:t>EDSTEM</a:t>
+            </a:r>
+          </a:p>
+          <a:p>
+            <a:pPr algn="ctr"/>
+            <a:r>
+              <a:rPr lang="de-DE" sz="1600" dirty="0" err="1" smtClean="0">
+                <a:solidFill>
+                  <a:schemeClr val="accent2">
+                    <a:lumMod val="50000"/>
+                  </a:schemeClr>
+                </a:solidFill>
+              </a:rPr>
+              <a:t>Spectrum</a:t>
             </a:r>
             <a:endParaRPr lang="de-DE" sz="1600" dirty="0" smtClean="0">
               <a:solidFill>
@@ -4494,37 +4513,17 @@
               </a:solidFill>
             </a:endParaRPr>
           </a:p>
-          <a:p>
-            <a:pPr algn="ctr"/>
-            <a:r>
-              <a:rPr lang="de-DE" sz="1600" dirty="0" err="1" smtClean="0">
-                <a:solidFill>
-                  <a:schemeClr val="accent2">
-                    <a:lumMod val="50000"/>
-                  </a:schemeClr>
-                </a:solidFill>
-              </a:rPr>
-              <a:t>Spectrum</a:t>
-            </a:r>
-            <a:endParaRPr lang="de-DE" sz="1600" dirty="0" smtClean="0">
-              <a:solidFill>
-                <a:schemeClr val="accent2">
-                  <a:lumMod val="50000"/>
-                </a:schemeClr>
-              </a:solidFill>
-            </a:endParaRPr>
-          </a:p>
-        </p:txBody>
-      </p:sp>
-      <p:sp>
-        <p:nvSpPr>
-          <p:cNvPr id="12" name="Abgerundetes Rechteck 11"/>
+        </p:txBody>
+      </p:sp>
+      <p:sp>
+        <p:nvSpPr>
+          <p:cNvPr id="23" name="Abgerundetes Rechteck 22"/>
           <p:cNvSpPr/>
           <p:nvPr/>
         </p:nvSpPr>
         <p:spPr>
           <a:xfrm>
-            <a:off x="107504" y="5663296"/>
+            <a:off x="2665900" y="4737411"/>
             <a:ext cx="1224135" cy="559482"/>
           </a:xfrm>
           <a:prstGeom prst="roundRect">
@@ -4573,7 +4572,7 @@
                   </a:schemeClr>
                 </a:solidFill>
               </a:rPr>
-              <a:t>EDSTEM</a:t>
+              <a:t>EELS</a:t>
             </a:r>
           </a:p>
           <a:p>
@@ -4600,13 +4599,13 @@
       </p:sp>
       <p:sp>
         <p:nvSpPr>
-          <p:cNvPr id="23" name="Abgerundetes Rechteck 22"/>
+          <p:cNvPr id="7" name="Abgerundetes Rechteck 6"/>
           <p:cNvSpPr/>
           <p:nvPr/>
         </p:nvSpPr>
         <p:spPr>
           <a:xfrm>
-            <a:off x="2665900" y="4737411"/>
+            <a:off x="3856823" y="1339954"/>
             <a:ext cx="1224135" cy="559482"/>
           </a:xfrm>
           <a:prstGeom prst="roundRect">
@@ -4648,27 +4647,14 @@
           <a:p>
             <a:pPr algn="ctr"/>
             <a:r>
-              <a:rPr lang="de-DE" sz="1600" dirty="0" smtClean="0">
+              <a:rPr lang="de-DE" sz="1600" dirty="0" err="1" smtClean="0">
                 <a:solidFill>
                   <a:schemeClr val="accent2">
                     <a:lumMod val="50000"/>
                   </a:schemeClr>
                 </a:solidFill>
               </a:rPr>
-              <a:t>EELS</a:t>
-            </a:r>
-          </a:p>
-          <a:p>
-            <a:pPr algn="ctr"/>
-            <a:r>
-              <a:rPr lang="de-DE" sz="1600" dirty="0" err="1" smtClean="0">
-                <a:solidFill>
-                  <a:schemeClr val="accent2">
-                    <a:lumMod val="50000"/>
-                  </a:schemeClr>
-                </a:solidFill>
-              </a:rPr>
-              <a:t>Spectrum</a:t>
+              <a:t>Complex</a:t>
             </a:r>
             <a:endParaRPr lang="de-DE" sz="1600" dirty="0" smtClean="0">
               <a:solidFill>
@@ -4678,17 +4664,223 @@
               </a:solidFill>
             </a:endParaRPr>
           </a:p>
-        </p:txBody>
-      </p:sp>
-      <p:sp>
-        <p:nvSpPr>
-          <p:cNvPr id="7" name="Abgerundetes Rechteck 6"/>
+          <a:p>
+            <a:pPr algn="ctr"/>
+            <a:r>
+              <a:rPr lang="de-DE" sz="1600" dirty="0" smtClean="0">
+                <a:solidFill>
+                  <a:schemeClr val="accent2">
+                    <a:lumMod val="50000"/>
+                  </a:schemeClr>
+                </a:solidFill>
+              </a:rPr>
+              <a:t>Signal</a:t>
+            </a:r>
+            <a:endParaRPr lang="en-GB" sz="1600" dirty="0">
+              <a:solidFill>
+                <a:schemeClr val="accent2">
+                  <a:lumMod val="50000"/>
+                </a:schemeClr>
+              </a:solidFill>
+            </a:endParaRPr>
+          </a:p>
+        </p:txBody>
+      </p:sp>
+      <p:sp>
+        <p:nvSpPr>
+          <p:cNvPr id="69" name="Textfeld 68"/>
+          <p:cNvSpPr txBox="1"/>
+          <p:nvPr/>
+        </p:nvSpPr>
+        <p:spPr>
+          <a:xfrm>
+            <a:off x="6948264" y="3085386"/>
+            <a:ext cx="2261901" cy="369332"/>
+          </a:xfrm>
+          <a:prstGeom prst="rect">
+            <a:avLst/>
+          </a:prstGeom>
+          <a:noFill/>
+        </p:spPr>
+        <p:txBody>
+          <a:bodyPr wrap="none" rtlCol="0">
+            <a:spAutoFit/>
+          </a:bodyPr>
+          <a:lstStyle/>
+          <a:p>
+            <a:r>
+              <a:rPr lang="de-DE" dirty="0" smtClean="0">
+                <a:solidFill>
+                  <a:schemeClr val="accent6">
+                    <a:lumMod val="75000"/>
+                  </a:schemeClr>
+                </a:solidFill>
+              </a:rPr>
+              <a:t>Signal </a:t>
+            </a:r>
+            <a:r>
+              <a:rPr lang="de-DE" dirty="0" smtClean="0">
+                <a:solidFill>
+                  <a:schemeClr val="accent6">
+                    <a:lumMod val="75000"/>
+                  </a:schemeClr>
+                </a:solidFill>
+              </a:rPr>
+              <a:t>type: </a:t>
+            </a:r>
+            <a:r>
+              <a:rPr lang="de-DE" i="1" dirty="0" err="1" smtClean="0">
+                <a:solidFill>
+                  <a:schemeClr val="accent6">
+                    <a:lumMod val="75000"/>
+                  </a:schemeClr>
+                </a:solidFill>
+              </a:rPr>
+              <a:t>undefined</a:t>
+            </a:r>
+            <a:endParaRPr lang="en-GB" i="1" dirty="0">
+              <a:solidFill>
+                <a:schemeClr val="accent6">
+                  <a:lumMod val="75000"/>
+                </a:schemeClr>
+              </a:solidFill>
+            </a:endParaRPr>
+          </a:p>
+        </p:txBody>
+      </p:sp>
+      <p:sp>
+        <p:nvSpPr>
+          <p:cNvPr id="70" name="Textfeld 69"/>
+          <p:cNvSpPr txBox="1"/>
+          <p:nvPr/>
+        </p:nvSpPr>
+        <p:spPr>
+          <a:xfrm>
+            <a:off x="6948264" y="3425015"/>
+            <a:ext cx="2024657" cy="369332"/>
+          </a:xfrm>
+          <a:prstGeom prst="rect">
+            <a:avLst/>
+          </a:prstGeom>
+          <a:noFill/>
+        </p:spPr>
+        <p:txBody>
+          <a:bodyPr wrap="none" rtlCol="0">
+            <a:spAutoFit/>
+          </a:bodyPr>
+          <a:lstStyle/>
+          <a:p>
+            <a:r>
+              <a:rPr lang="de-DE" dirty="0" smtClean="0">
+                <a:solidFill>
+                  <a:schemeClr val="accent6">
+                    <a:lumMod val="75000"/>
+                  </a:schemeClr>
+                </a:solidFill>
+              </a:rPr>
+              <a:t>Signal </a:t>
+            </a:r>
+            <a:r>
+              <a:rPr lang="de-DE" dirty="0" smtClean="0">
+                <a:solidFill>
+                  <a:schemeClr val="accent6">
+                    <a:lumMod val="75000"/>
+                  </a:schemeClr>
+                </a:solidFill>
+              </a:rPr>
+              <a:t>type: </a:t>
+            </a:r>
+            <a:r>
+              <a:rPr lang="de-DE" i="1" dirty="0" err="1" smtClean="0">
+                <a:solidFill>
+                  <a:schemeClr val="accent6">
+                    <a:lumMod val="75000"/>
+                  </a:schemeClr>
+                </a:solidFill>
+              </a:rPr>
+              <a:t>defined</a:t>
+            </a:r>
+            <a:endParaRPr lang="en-GB" i="1" dirty="0">
+              <a:solidFill>
+                <a:schemeClr val="accent6">
+                  <a:lumMod val="75000"/>
+                </a:schemeClr>
+              </a:solidFill>
+            </a:endParaRPr>
+          </a:p>
+        </p:txBody>
+      </p:sp>
+      <p:sp>
+        <p:nvSpPr>
+          <p:cNvPr id="72" name="Textfeld 71"/>
+          <p:cNvSpPr txBox="1"/>
+          <p:nvPr/>
+        </p:nvSpPr>
+        <p:spPr>
+          <a:xfrm>
+            <a:off x="3652696" y="-24487"/>
+            <a:ext cx="1801647" cy="369332"/>
+          </a:xfrm>
+          <a:prstGeom prst="rect">
+            <a:avLst/>
+          </a:prstGeom>
+          <a:noFill/>
+        </p:spPr>
+        <p:txBody>
+          <a:bodyPr wrap="none" rtlCol="0">
+            <a:spAutoFit/>
+          </a:bodyPr>
+          <a:lstStyle/>
+          <a:p>
+            <a:r>
+              <a:rPr lang="de-DE" dirty="0" err="1" smtClean="0">
+                <a:solidFill>
+                  <a:schemeClr val="accent3">
+                    <a:lumMod val="75000"/>
+                  </a:schemeClr>
+                </a:solidFill>
+              </a:rPr>
+              <a:t>dtype</a:t>
+            </a:r>
+            <a:r>
+              <a:rPr lang="de-DE" dirty="0" smtClean="0">
+                <a:solidFill>
+                  <a:schemeClr val="accent3">
+                    <a:lumMod val="75000"/>
+                  </a:schemeClr>
+                </a:solidFill>
+              </a:rPr>
+              <a:t>: </a:t>
+            </a:r>
+            <a:r>
+              <a:rPr lang="de-DE" i="1" dirty="0" err="1" smtClean="0">
+                <a:solidFill>
+                  <a:schemeClr val="accent3">
+                    <a:lumMod val="75000"/>
+                  </a:schemeClr>
+                </a:solidFill>
+              </a:rPr>
+              <a:t>undefined</a:t>
+            </a:r>
+            <a:endParaRPr lang="en-GB" i="1" dirty="0">
+              <a:solidFill>
+                <a:schemeClr val="accent3">
+                  <a:lumMod val="75000"/>
+                </a:schemeClr>
+              </a:solidFill>
+            </a:endParaRPr>
+          </a:p>
+        </p:txBody>
+      </p:sp>
+      <p:sp>
+        <p:nvSpPr>
+          <p:cNvPr id="33" name="Abgerundetes Rechteck 32"/>
           <p:cNvSpPr/>
           <p:nvPr/>
         </p:nvSpPr>
         <p:spPr>
           <a:xfrm>
-            <a:off x="3856823" y="1339954"/>
+            <a:off x="2995382" y="2464432"/>
             <a:ext cx="1224135" cy="559482"/>
           </a:xfrm>
           <a:prstGeom prst="roundRect">
@@ -4739,6 +4931,16 @@
               </a:rPr>
               <a:t>Complex</a:t>
             </a:r>
+            <a:r>
+              <a:rPr lang="de-DE" sz="1600" dirty="0" smtClean="0">
+                <a:solidFill>
+                  <a:schemeClr val="accent2">
+                    <a:lumMod val="50000"/>
+                  </a:schemeClr>
+                </a:solidFill>
+              </a:rPr>
+              <a:t> Signal1D</a:t>
+            </a:r>
             <a:endParaRPr lang="de-DE" sz="1600" dirty="0" smtClean="0">
               <a:solidFill>
                 <a:schemeClr val="accent2">
@@ -4747,17 +4949,86 @@
               </a:solidFill>
             </a:endParaRPr>
           </a:p>
+        </p:txBody>
+      </p:sp>
+      <p:sp>
+        <p:nvSpPr>
+          <p:cNvPr id="34" name="Abgerundetes Rechteck 33"/>
+          <p:cNvSpPr/>
+          <p:nvPr/>
+        </p:nvSpPr>
+        <p:spPr>
+          <a:xfrm>
+            <a:off x="4716016" y="2464431"/>
+            <a:ext cx="1224135" cy="559482"/>
+          </a:xfrm>
+          <a:prstGeom prst="roundRect">
+            <a:avLst/>
+          </a:prstGeom>
+          <a:solidFill>
+            <a:schemeClr val="accent2">
+              <a:lumMod val="60000"/>
+              <a:lumOff val="40000"/>
+            </a:schemeClr>
+          </a:solidFill>
+          <a:ln>
+            <a:solidFill>
+              <a:schemeClr val="accent2">
+                <a:lumMod val="75000"/>
+              </a:schemeClr>
+            </a:solidFill>
+          </a:ln>
+        </p:spPr>
+        <p:style>
+          <a:lnRef idx="2">
+            <a:schemeClr val="accent1">
+              <a:shade val="50000"/>
+            </a:schemeClr>
+          </a:lnRef>
+          <a:fillRef idx="1">
+            <a:schemeClr val="accent1"/>
+          </a:fillRef>
+          <a:effectRef idx="0">
+            <a:schemeClr val="accent1"/>
+          </a:effectRef>
+          <a:fontRef idx="minor">
+            <a:schemeClr val="lt1"/>
+          </a:fontRef>
+        </p:style>
+        <p:txBody>
+          <a:bodyPr rtlCol="0" anchor="ctr"/>
+          <a:lstStyle/>
           <a:p>
             <a:pPr algn="ctr"/>
             <a:r>
-              <a:rPr lang="de-DE" sz="1600" dirty="0" smtClean="0">
+              <a:rPr lang="de-DE" sz="1600" dirty="0" err="1">
                 <a:solidFill>
                   <a:schemeClr val="accent2">
                     <a:lumMod val="50000"/>
                   </a:schemeClr>
                 </a:solidFill>
               </a:rPr>
-              <a:t>Signal</a:t>
+              <a:t>Complex</a:t>
+            </a:r>
+            <a:r>
+              <a:rPr lang="de-DE" sz="1600" dirty="0">
+                <a:solidFill>
+                  <a:schemeClr val="accent2">
+                    <a:lumMod val="50000"/>
+                  </a:schemeClr>
+                </a:solidFill>
+              </a:rPr>
+              <a:t> </a:t>
+            </a:r>
+            <a:r>
+              <a:rPr lang="de-DE" sz="1600" dirty="0" smtClean="0">
+                <a:solidFill>
+                  <a:schemeClr val="accent2">
+                    <a:lumMod val="50000"/>
+                  </a:schemeClr>
+                </a:solidFill>
+              </a:rPr>
+              <a:t>Signal2D</a:t>
             </a:r>
             <a:endParaRPr lang="en-GB" sz="1600" dirty="0">
               <a:solidFill>
@@ -4769,172 +5040,45 @@
           </a:p>
         </p:txBody>
       </p:sp>
-      <p:sp>
-        <p:nvSpPr>
-          <p:cNvPr id="69" name="Textfeld 68"/>
-          <p:cNvSpPr txBox="1"/>
+      <p:cxnSp>
+        <p:nvCxnSpPr>
+          <p:cNvPr id="49" name="Gerade Verbindung mit Pfeil 48"/>
+          <p:cNvCxnSpPr>
+            <a:stCxn id="33" idx="2"/>
+            <a:endCxn id="8" idx="0"/>
+          </p:cNvCxnSpPr>
           <p:nvPr/>
-        </p:nvSpPr>
+        </p:nvCxnSpPr>
         <p:spPr>
           <a:xfrm>
-            <a:off x="6827791" y="3071070"/>
-            <a:ext cx="2285754" cy="369332"/>
-          </a:xfrm>
-          <a:prstGeom prst="rect">
+            <a:off x="3607450" y="3023914"/>
+            <a:ext cx="1" cy="594962"/>
+          </a:xfrm>
+          <a:prstGeom prst="straightConnector1">
             <a:avLst/>
           </a:prstGeom>
-          <a:noFill/>
-        </p:spPr>
-        <p:txBody>
-          <a:bodyPr wrap="none" rtlCol="0">
-            <a:spAutoFit/>
-          </a:bodyPr>
-          <a:lstStyle/>
-          <a:p>
-            <a:r>
-              <a:rPr lang="de-DE" dirty="0" smtClean="0">
-                <a:solidFill>
-                  <a:schemeClr val="accent6">
-                    <a:lumMod val="75000"/>
-                  </a:schemeClr>
-                </a:solidFill>
-              </a:rPr>
-              <a:t>Signal type: </a:t>
-            </a:r>
-            <a:r>
-              <a:rPr lang="de-DE" i="1" dirty="0" err="1" smtClean="0">
-                <a:solidFill>
-                  <a:schemeClr val="accent6">
-                    <a:lumMod val="75000"/>
-                  </a:schemeClr>
-                </a:solidFill>
-              </a:rPr>
-              <a:t>undefined</a:t>
-            </a:r>
-            <a:endParaRPr lang="en-GB" i="1" dirty="0">
-              <a:solidFill>
-                <a:schemeClr val="accent6">
-                  <a:lumMod val="75000"/>
-                </a:schemeClr>
-              </a:solidFill>
-            </a:endParaRPr>
-          </a:p>
-        </p:txBody>
-      </p:sp>
-      <p:sp>
-        <p:nvSpPr>
-          <p:cNvPr id="70" name="Textfeld 69"/>
-          <p:cNvSpPr txBox="1"/>
-          <p:nvPr/>
-        </p:nvSpPr>
-        <p:spPr>
-          <a:xfrm>
-            <a:off x="6842072" y="3425015"/>
-            <a:ext cx="2024657" cy="369332"/>
-          </a:xfrm>
-          <a:prstGeom prst="rect">
-            <a:avLst/>
-          </a:prstGeom>
-          <a:noFill/>
-        </p:spPr>
-        <p:txBody>
-          <a:bodyPr wrap="none" rtlCol="0">
-            <a:spAutoFit/>
-          </a:bodyPr>
-          <a:lstStyle/>
-          <a:p>
-            <a:r>
-              <a:rPr lang="de-DE" dirty="0" smtClean="0">
-                <a:solidFill>
-                  <a:schemeClr val="accent6">
-                    <a:lumMod val="75000"/>
-                  </a:schemeClr>
-                </a:solidFill>
-              </a:rPr>
-              <a:t>Signal type: </a:t>
-            </a:r>
-            <a:r>
-              <a:rPr lang="de-DE" i="1" dirty="0" err="1" smtClean="0">
-                <a:solidFill>
-                  <a:schemeClr val="accent6">
-                    <a:lumMod val="75000"/>
-                  </a:schemeClr>
-                </a:solidFill>
-              </a:rPr>
-              <a:t>defined</a:t>
-            </a:r>
-            <a:endParaRPr lang="en-GB" i="1" dirty="0">
-              <a:solidFill>
-                <a:schemeClr val="accent6">
-                  <a:lumMod val="75000"/>
-                </a:schemeClr>
-              </a:solidFill>
-            </a:endParaRPr>
-          </a:p>
-        </p:txBody>
-      </p:sp>
-      <p:sp>
-        <p:nvSpPr>
-          <p:cNvPr id="72" name="Textfeld 71"/>
-          <p:cNvSpPr txBox="1"/>
-          <p:nvPr/>
-        </p:nvSpPr>
-        <p:spPr>
-          <a:xfrm>
-            <a:off x="3652696" y="-24487"/>
-            <a:ext cx="1801647" cy="369332"/>
-          </a:xfrm>
-          <a:prstGeom prst="rect">
-            <a:avLst/>
-          </a:prstGeom>
-          <a:noFill/>
-        </p:spPr>
-        <p:txBody>
-          <a:bodyPr wrap="none" rtlCol="0">
-            <a:spAutoFit/>
-          </a:bodyPr>
-          <a:lstStyle/>
-          <a:p>
-            <a:r>
-              <a:rPr lang="de-DE" dirty="0" err="1" smtClean="0">
-                <a:solidFill>
-                  <a:schemeClr val="accent3">
-                    <a:lumMod val="75000"/>
-                  </a:schemeClr>
-                </a:solidFill>
-              </a:rPr>
-              <a:t>dtype</a:t>
-            </a:r>
-            <a:r>
-              <a:rPr lang="de-DE" dirty="0" smtClean="0">
-                <a:solidFill>
-                  <a:schemeClr val="accent3">
-                    <a:lumMod val="75000"/>
-                  </a:schemeClr>
-                </a:solidFill>
-              </a:rPr>
-              <a:t>: </a:t>
-            </a:r>
-            <a:r>
-              <a:rPr lang="de-DE" i="1" dirty="0" err="1" smtClean="0">
-                <a:solidFill>
-                  <a:schemeClr val="accent3">
-                    <a:lumMod val="75000"/>
-                  </a:schemeClr>
-                </a:solidFill>
-              </a:rPr>
-              <a:t>undefined</a:t>
-            </a:r>
-            <a:endParaRPr lang="en-GB" i="1" dirty="0">
-              <a:solidFill>
-                <a:schemeClr val="accent3">
-                  <a:lumMod val="75000"/>
-                </a:schemeClr>
-              </a:solidFill>
-            </a:endParaRPr>
-          </a:p>
-        </p:txBody>
-      </p:sp>
+          <a:ln w="38100">
+            <a:solidFill>
+              <a:schemeClr val="accent2"/>
+            </a:solidFill>
+            <a:tailEnd type="arrow"/>
+          </a:ln>
+        </p:spPr>
+        <p:style>
+          <a:lnRef idx="1">
+            <a:schemeClr val="accent1"/>
+          </a:lnRef>
+          <a:fillRef idx="0">
+            <a:schemeClr val="accent1"/>
+          </a:fillRef>
+          <a:effectRef idx="0">
+            <a:schemeClr val="accent1"/>
+          </a:effectRef>
+          <a:fontRef idx="minor">
+            <a:schemeClr val="tx1"/>
+          </a:fontRef>
+        </p:style>
+      </p:cxnSp>
     </p:spTree>
     <p:extLst>
       <p:ext uri="{BB962C8B-B14F-4D97-AF65-F5344CB8AC3E}">

</xml_diff>

<commit_message>
Changed picture showing scheme of signals
</commit_message>
<xml_diff>
--- a/doc/user_guide/images/HyperSpySignalOverview.pptx
+++ b/doc/user_guide/images/HyperSpySignalOverview.pptx
@@ -288,7 +288,7 @@
           <a:p>
             <a:fld id="{2E6F31E7-F7C9-4F09-AB17-051C3CE0F15A}" type="datetimeFigureOut">
               <a:rPr lang="en-GB" smtClean="0"/>
-              <a:t>08/07/2016</a:t>
+              <a:t>14/07/16</a:t>
             </a:fld>
             <a:endParaRPr lang="en-GB"/>
           </a:p>
@@ -330,7 +330,7 @@
           <a:p>
             <a:fld id="{EDB38D19-E595-49F3-A93E-1DDDDE122E43}" type="slidenum">
               <a:rPr lang="en-GB" smtClean="0"/>
-              <a:t>‹Nr.›</a:t>
+              <a:t>‹#›</a:t>
             </a:fld>
             <a:endParaRPr lang="en-GB"/>
           </a:p>
@@ -458,7 +458,7 @@
           <a:p>
             <a:fld id="{2E6F31E7-F7C9-4F09-AB17-051C3CE0F15A}" type="datetimeFigureOut">
               <a:rPr lang="en-GB" smtClean="0"/>
-              <a:t>08/07/2016</a:t>
+              <a:t>14/07/16</a:t>
             </a:fld>
             <a:endParaRPr lang="en-GB"/>
           </a:p>
@@ -500,7 +500,7 @@
           <a:p>
             <a:fld id="{EDB38D19-E595-49F3-A93E-1DDDDE122E43}" type="slidenum">
               <a:rPr lang="en-GB" smtClean="0"/>
-              <a:t>‹Nr.›</a:t>
+              <a:t>‹#›</a:t>
             </a:fld>
             <a:endParaRPr lang="en-GB"/>
           </a:p>
@@ -638,7 +638,7 @@
           <a:p>
             <a:fld id="{2E6F31E7-F7C9-4F09-AB17-051C3CE0F15A}" type="datetimeFigureOut">
               <a:rPr lang="en-GB" smtClean="0"/>
-              <a:t>08/07/2016</a:t>
+              <a:t>14/07/16</a:t>
             </a:fld>
             <a:endParaRPr lang="en-GB"/>
           </a:p>
@@ -680,7 +680,7 @@
           <a:p>
             <a:fld id="{EDB38D19-E595-49F3-A93E-1DDDDE122E43}" type="slidenum">
               <a:rPr lang="en-GB" smtClean="0"/>
-              <a:t>‹Nr.›</a:t>
+              <a:t>‹#›</a:t>
             </a:fld>
             <a:endParaRPr lang="en-GB"/>
           </a:p>
@@ -808,7 +808,7 @@
           <a:p>
             <a:fld id="{2E6F31E7-F7C9-4F09-AB17-051C3CE0F15A}" type="datetimeFigureOut">
               <a:rPr lang="en-GB" smtClean="0"/>
-              <a:t>08/07/2016</a:t>
+              <a:t>14/07/16</a:t>
             </a:fld>
             <a:endParaRPr lang="en-GB"/>
           </a:p>
@@ -850,7 +850,7 @@
           <a:p>
             <a:fld id="{EDB38D19-E595-49F3-A93E-1DDDDE122E43}" type="slidenum">
               <a:rPr lang="en-GB" smtClean="0"/>
-              <a:t>‹Nr.›</a:t>
+              <a:t>‹#›</a:t>
             </a:fld>
             <a:endParaRPr lang="en-GB"/>
           </a:p>
@@ -1054,7 +1054,7 @@
           <a:p>
             <a:fld id="{2E6F31E7-F7C9-4F09-AB17-051C3CE0F15A}" type="datetimeFigureOut">
               <a:rPr lang="en-GB" smtClean="0"/>
-              <a:t>08/07/2016</a:t>
+              <a:t>14/07/16</a:t>
             </a:fld>
             <a:endParaRPr lang="en-GB"/>
           </a:p>
@@ -1096,7 +1096,7 @@
           <a:p>
             <a:fld id="{EDB38D19-E595-49F3-A93E-1DDDDE122E43}" type="slidenum">
               <a:rPr lang="en-GB" smtClean="0"/>
-              <a:t>‹Nr.›</a:t>
+              <a:t>‹#›</a:t>
             </a:fld>
             <a:endParaRPr lang="en-GB"/>
           </a:p>
@@ -1342,7 +1342,7 @@
           <a:p>
             <a:fld id="{2E6F31E7-F7C9-4F09-AB17-051C3CE0F15A}" type="datetimeFigureOut">
               <a:rPr lang="en-GB" smtClean="0"/>
-              <a:t>08/07/2016</a:t>
+              <a:t>14/07/16</a:t>
             </a:fld>
             <a:endParaRPr lang="en-GB"/>
           </a:p>
@@ -1384,7 +1384,7 @@
           <a:p>
             <a:fld id="{EDB38D19-E595-49F3-A93E-1DDDDE122E43}" type="slidenum">
               <a:rPr lang="en-GB" smtClean="0"/>
-              <a:t>‹Nr.›</a:t>
+              <a:t>‹#›</a:t>
             </a:fld>
             <a:endParaRPr lang="en-GB"/>
           </a:p>
@@ -1764,7 +1764,7 @@
           <a:p>
             <a:fld id="{2E6F31E7-F7C9-4F09-AB17-051C3CE0F15A}" type="datetimeFigureOut">
               <a:rPr lang="en-GB" smtClean="0"/>
-              <a:t>08/07/2016</a:t>
+              <a:t>14/07/16</a:t>
             </a:fld>
             <a:endParaRPr lang="en-GB"/>
           </a:p>
@@ -1806,7 +1806,7 @@
           <a:p>
             <a:fld id="{EDB38D19-E595-49F3-A93E-1DDDDE122E43}" type="slidenum">
               <a:rPr lang="en-GB" smtClean="0"/>
-              <a:t>‹Nr.›</a:t>
+              <a:t>‹#›</a:t>
             </a:fld>
             <a:endParaRPr lang="en-GB"/>
           </a:p>
@@ -1882,7 +1882,7 @@
           <a:p>
             <a:fld id="{2E6F31E7-F7C9-4F09-AB17-051C3CE0F15A}" type="datetimeFigureOut">
               <a:rPr lang="en-GB" smtClean="0"/>
-              <a:t>08/07/2016</a:t>
+              <a:t>14/07/16</a:t>
             </a:fld>
             <a:endParaRPr lang="en-GB"/>
           </a:p>
@@ -1924,7 +1924,7 @@
           <a:p>
             <a:fld id="{EDB38D19-E595-49F3-A93E-1DDDDE122E43}" type="slidenum">
               <a:rPr lang="en-GB" smtClean="0"/>
-              <a:t>‹Nr.›</a:t>
+              <a:t>‹#›</a:t>
             </a:fld>
             <a:endParaRPr lang="en-GB"/>
           </a:p>
@@ -1977,7 +1977,7 @@
           <a:p>
             <a:fld id="{2E6F31E7-F7C9-4F09-AB17-051C3CE0F15A}" type="datetimeFigureOut">
               <a:rPr lang="en-GB" smtClean="0"/>
-              <a:t>08/07/2016</a:t>
+              <a:t>14/07/16</a:t>
             </a:fld>
             <a:endParaRPr lang="en-GB"/>
           </a:p>
@@ -2019,7 +2019,7 @@
           <a:p>
             <a:fld id="{EDB38D19-E595-49F3-A93E-1DDDDE122E43}" type="slidenum">
               <a:rPr lang="en-GB" smtClean="0"/>
-              <a:t>‹Nr.›</a:t>
+              <a:t>‹#›</a:t>
             </a:fld>
             <a:endParaRPr lang="en-GB"/>
           </a:p>
@@ -2254,7 +2254,7 @@
           <a:p>
             <a:fld id="{2E6F31E7-F7C9-4F09-AB17-051C3CE0F15A}" type="datetimeFigureOut">
               <a:rPr lang="en-GB" smtClean="0"/>
-              <a:t>08/07/2016</a:t>
+              <a:t>14/07/16</a:t>
             </a:fld>
             <a:endParaRPr lang="en-GB"/>
           </a:p>
@@ -2296,7 +2296,7 @@
           <a:p>
             <a:fld id="{EDB38D19-E595-49F3-A93E-1DDDDE122E43}" type="slidenum">
               <a:rPr lang="en-GB" smtClean="0"/>
-              <a:t>‹Nr.›</a:t>
+              <a:t>‹#›</a:t>
             </a:fld>
             <a:endParaRPr lang="en-GB"/>
           </a:p>
@@ -2507,7 +2507,7 @@
           <a:p>
             <a:fld id="{2E6F31E7-F7C9-4F09-AB17-051C3CE0F15A}" type="datetimeFigureOut">
               <a:rPr lang="en-GB" smtClean="0"/>
-              <a:t>08/07/2016</a:t>
+              <a:t>14/07/16</a:t>
             </a:fld>
             <a:endParaRPr lang="en-GB"/>
           </a:p>
@@ -2549,7 +2549,7 @@
           <a:p>
             <a:fld id="{EDB38D19-E595-49F3-A93E-1DDDDE122E43}" type="slidenum">
               <a:rPr lang="en-GB" smtClean="0"/>
-              <a:t>‹Nr.›</a:t>
+              <a:t>‹#›</a:t>
             </a:fld>
             <a:endParaRPr lang="en-GB"/>
           </a:p>
@@ -2720,7 +2720,7 @@
           <a:p>
             <a:fld id="{2E6F31E7-F7C9-4F09-AB17-051C3CE0F15A}" type="datetimeFigureOut">
               <a:rPr lang="en-GB" smtClean="0"/>
-              <a:t>08/07/2016</a:t>
+              <a:t>14/07/16</a:t>
             </a:fld>
             <a:endParaRPr lang="en-GB"/>
           </a:p>
@@ -2798,7 +2798,7 @@
           <a:p>
             <a:fld id="{EDB38D19-E595-49F3-A93E-1DDDDE122E43}" type="slidenum">
               <a:rPr lang="en-GB" smtClean="0"/>
-              <a:t>‹Nr.›</a:t>
+              <a:t>‹#›</a:t>
             </a:fld>
             <a:endParaRPr lang="en-GB"/>
           </a:p>
@@ -4716,17 +4716,7 @@
                   </a:schemeClr>
                 </a:solidFill>
               </a:rPr>
-              <a:t>Signal </a:t>
-            </a:r>
-            <a:r>
-              <a:rPr lang="de-DE" dirty="0" smtClean="0">
-                <a:solidFill>
-                  <a:schemeClr val="accent6">
-                    <a:lumMod val="75000"/>
-                  </a:schemeClr>
-                </a:solidFill>
-              </a:rPr>
-              <a:t>type: </a:t>
+              <a:t>Signal type: </a:t>
             </a:r>
             <a:r>
               <a:rPr lang="de-DE" i="1" dirty="0" err="1" smtClean="0">
@@ -4778,17 +4768,7 @@
                   </a:schemeClr>
                 </a:solidFill>
               </a:rPr>
-              <a:t>Signal </a:t>
-            </a:r>
-            <a:r>
-              <a:rPr lang="de-DE" dirty="0" smtClean="0">
-                <a:solidFill>
-                  <a:schemeClr val="accent6">
-                    <a:lumMod val="75000"/>
-                  </a:schemeClr>
-                </a:solidFill>
-              </a:rPr>
-              <a:t>type: </a:t>
+              <a:t>Signal type: </a:t>
             </a:r>
             <a:r>
               <a:rPr lang="de-DE" i="1" dirty="0" err="1" smtClean="0">
@@ -4941,13 +4921,6 @@
               </a:rPr>
               <a:t> Signal1D</a:t>
             </a:r>
-            <a:endParaRPr lang="de-DE" sz="1600" dirty="0" smtClean="0">
-              <a:solidFill>
-                <a:schemeClr val="accent2">
-                  <a:lumMod val="50000"/>
-                </a:schemeClr>
-              </a:solidFill>
-            </a:endParaRPr>
           </a:p>
         </p:txBody>
       </p:sp>
@@ -5053,6 +5026,134 @@
           <a:xfrm>
             <a:off x="3607450" y="3023914"/>
             <a:ext cx="1" cy="594962"/>
+          </a:xfrm>
+          <a:prstGeom prst="straightConnector1">
+            <a:avLst/>
+          </a:prstGeom>
+          <a:ln w="38100">
+            <a:solidFill>
+              <a:schemeClr val="accent2"/>
+            </a:solidFill>
+            <a:tailEnd type="arrow"/>
+          </a:ln>
+        </p:spPr>
+        <p:style>
+          <a:lnRef idx="1">
+            <a:schemeClr val="accent1"/>
+          </a:lnRef>
+          <a:fillRef idx="0">
+            <a:schemeClr val="accent1"/>
+          </a:fillRef>
+          <a:effectRef idx="0">
+            <a:schemeClr val="accent1"/>
+          </a:effectRef>
+          <a:fontRef idx="minor">
+            <a:schemeClr val="tx1"/>
+          </a:fontRef>
+        </p:style>
+      </p:cxnSp>
+      <p:sp>
+        <p:nvSpPr>
+          <p:cNvPr id="37" name="Abgerundetes Rechteck 5"/>
+          <p:cNvSpPr/>
+          <p:nvPr/>
+        </p:nvSpPr>
+        <p:spPr>
+          <a:xfrm>
+            <a:off x="6228184" y="4725144"/>
+            <a:ext cx="1224135" cy="559482"/>
+          </a:xfrm>
+          <a:prstGeom prst="roundRect">
+            <a:avLst/>
+          </a:prstGeom>
+          <a:solidFill>
+            <a:schemeClr val="accent2">
+              <a:lumMod val="60000"/>
+              <a:lumOff val="40000"/>
+            </a:schemeClr>
+          </a:solidFill>
+          <a:ln>
+            <a:solidFill>
+              <a:schemeClr val="accent2">
+                <a:lumMod val="75000"/>
+              </a:schemeClr>
+            </a:solidFill>
+          </a:ln>
+        </p:spPr>
+        <p:style>
+          <a:lnRef idx="2">
+            <a:schemeClr val="accent1">
+              <a:shade val="50000"/>
+            </a:schemeClr>
+          </a:lnRef>
+          <a:fillRef idx="1">
+            <a:schemeClr val="accent1"/>
+          </a:fillRef>
+          <a:effectRef idx="0">
+            <a:schemeClr val="accent1"/>
+          </a:effectRef>
+          <a:fontRef idx="minor">
+            <a:schemeClr val="lt1"/>
+          </a:fontRef>
+        </p:style>
+        <p:txBody>
+          <a:bodyPr rtlCol="0" anchor="ctr"/>
+          <a:lstStyle/>
+          <a:p>
+            <a:pPr algn="ctr"/>
+            <a:r>
+              <a:rPr lang="de-DE" sz="1600" dirty="0" err="1" smtClean="0">
+                <a:solidFill>
+                  <a:schemeClr val="accent2">
+                    <a:lumMod val="50000"/>
+                  </a:schemeClr>
+                </a:solidFill>
+              </a:rPr>
+              <a:t>Hologram</a:t>
+            </a:r>
+            <a:endParaRPr lang="de-DE" sz="1600" dirty="0" smtClean="0">
+              <a:solidFill>
+                <a:schemeClr val="accent2">
+                  <a:lumMod val="50000"/>
+                </a:schemeClr>
+              </a:solidFill>
+            </a:endParaRPr>
+          </a:p>
+          <a:p>
+            <a:pPr algn="ctr"/>
+            <a:r>
+              <a:rPr lang="de-DE" sz="1600" dirty="0" smtClean="0">
+                <a:solidFill>
+                  <a:schemeClr val="accent2">
+                    <a:lumMod val="50000"/>
+                  </a:schemeClr>
+                </a:solidFill>
+              </a:rPr>
+              <a:t>Image</a:t>
+            </a:r>
+            <a:endParaRPr lang="en-GB" sz="1600" dirty="0">
+              <a:solidFill>
+                <a:schemeClr val="accent2">
+                  <a:lumMod val="50000"/>
+                </a:schemeClr>
+              </a:solidFill>
+            </a:endParaRPr>
+          </a:p>
+        </p:txBody>
+      </p:sp>
+      <p:cxnSp>
+        <p:nvCxnSpPr>
+          <p:cNvPr id="13" name="Straight Arrow Connector 12"/>
+          <p:cNvCxnSpPr>
+            <a:stCxn id="6" idx="2"/>
+            <a:endCxn id="37" idx="0"/>
+          </p:cNvCxnSpPr>
+          <p:nvPr/>
+        </p:nvCxnSpPr>
+        <p:spPr>
+          <a:xfrm>
+            <a:off x="6840252" y="3023913"/>
+            <a:ext cx="0" cy="1701231"/>
           </a:xfrm>
           <a:prstGeom prst="straightConnector1">
             <a:avLst/>
@@ -5372,7 +5473,34 @@
       </a:bgFillStyleLst>
     </a:fmtScheme>
   </a:themeElements>
-  <a:objectDefaults/>
+  <a:objectDefaults>
+    <a:lnDef>
+      <a:spPr>
+        <a:ln w="38100">
+          <a:solidFill>
+            <a:schemeClr val="accent2"/>
+          </a:solidFill>
+          <a:tailEnd type="arrow"/>
+        </a:ln>
+      </a:spPr>
+      <a:bodyPr/>
+      <a:lstStyle/>
+      <a:style>
+        <a:lnRef idx="1">
+          <a:schemeClr val="accent1"/>
+        </a:lnRef>
+        <a:fillRef idx="0">
+          <a:schemeClr val="accent1"/>
+        </a:fillRef>
+        <a:effectRef idx="0">
+          <a:schemeClr val="accent1"/>
+        </a:effectRef>
+        <a:fontRef idx="minor">
+          <a:schemeClr val="tx1"/>
+        </a:fontRef>
+      </a:style>
+    </a:lnDef>
+  </a:objectDefaults>
   <a:extraClrSchemeLst/>
 </a:theme>
 </file>
</xml_diff>